<commit_message>
:ok_hand: Fixed solver flowchart
Cf. https://gitlab.sirehna.com/sirehna/xdyn/-/merge_requests/149#note_110002
</commit_message>
<xml_diff>
--- a/doc_user/solver.pptx
+++ b/doc_user/solver.pptx
@@ -304,7 +304,7 @@
           <a:p>
             <a:fld id="{1AC609C6-5DB6-4698-A3AD-5115AB57A1D5}" type="datetimeFigureOut">
               <a:rPr lang="en-US" smtClean="0"/>
-              <a:t>4/11/2022</a:t>
+              <a:t>4/26/2022</a:t>
             </a:fld>
             <a:endParaRPr lang="en-US"/>
           </a:p>
@@ -474,7 +474,7 @@
           <a:p>
             <a:fld id="{1AC609C6-5DB6-4698-A3AD-5115AB57A1D5}" type="datetimeFigureOut">
               <a:rPr lang="en-US" smtClean="0"/>
-              <a:t>4/11/2022</a:t>
+              <a:t>4/26/2022</a:t>
             </a:fld>
             <a:endParaRPr lang="en-US"/>
           </a:p>
@@ -654,7 +654,7 @@
           <a:p>
             <a:fld id="{1AC609C6-5DB6-4698-A3AD-5115AB57A1D5}" type="datetimeFigureOut">
               <a:rPr lang="en-US" smtClean="0"/>
-              <a:t>4/11/2022</a:t>
+              <a:t>4/26/2022</a:t>
             </a:fld>
             <a:endParaRPr lang="en-US"/>
           </a:p>
@@ -824,7 +824,7 @@
           <a:p>
             <a:fld id="{1AC609C6-5DB6-4698-A3AD-5115AB57A1D5}" type="datetimeFigureOut">
               <a:rPr lang="en-US" smtClean="0"/>
-              <a:t>4/11/2022</a:t>
+              <a:t>4/26/2022</a:t>
             </a:fld>
             <a:endParaRPr lang="en-US"/>
           </a:p>
@@ -1070,7 +1070,7 @@
           <a:p>
             <a:fld id="{1AC609C6-5DB6-4698-A3AD-5115AB57A1D5}" type="datetimeFigureOut">
               <a:rPr lang="en-US" smtClean="0"/>
-              <a:t>4/11/2022</a:t>
+              <a:t>4/26/2022</a:t>
             </a:fld>
             <a:endParaRPr lang="en-US"/>
           </a:p>
@@ -1358,7 +1358,7 @@
           <a:p>
             <a:fld id="{1AC609C6-5DB6-4698-A3AD-5115AB57A1D5}" type="datetimeFigureOut">
               <a:rPr lang="en-US" smtClean="0"/>
-              <a:t>4/11/2022</a:t>
+              <a:t>4/26/2022</a:t>
             </a:fld>
             <a:endParaRPr lang="en-US"/>
           </a:p>
@@ -1780,7 +1780,7 @@
           <a:p>
             <a:fld id="{1AC609C6-5DB6-4698-A3AD-5115AB57A1D5}" type="datetimeFigureOut">
               <a:rPr lang="en-US" smtClean="0"/>
-              <a:t>4/11/2022</a:t>
+              <a:t>4/26/2022</a:t>
             </a:fld>
             <a:endParaRPr lang="en-US"/>
           </a:p>
@@ -1898,7 +1898,7 @@
           <a:p>
             <a:fld id="{1AC609C6-5DB6-4698-A3AD-5115AB57A1D5}" type="datetimeFigureOut">
               <a:rPr lang="en-US" smtClean="0"/>
-              <a:t>4/11/2022</a:t>
+              <a:t>4/26/2022</a:t>
             </a:fld>
             <a:endParaRPr lang="en-US"/>
           </a:p>
@@ -1993,7 +1993,7 @@
           <a:p>
             <a:fld id="{1AC609C6-5DB6-4698-A3AD-5115AB57A1D5}" type="datetimeFigureOut">
               <a:rPr lang="en-US" smtClean="0"/>
-              <a:t>4/11/2022</a:t>
+              <a:t>4/26/2022</a:t>
             </a:fld>
             <a:endParaRPr lang="en-US"/>
           </a:p>
@@ -2270,7 +2270,7 @@
           <a:p>
             <a:fld id="{1AC609C6-5DB6-4698-A3AD-5115AB57A1D5}" type="datetimeFigureOut">
               <a:rPr lang="en-US" smtClean="0"/>
-              <a:t>4/11/2022</a:t>
+              <a:t>4/26/2022</a:t>
             </a:fld>
             <a:endParaRPr lang="en-US"/>
           </a:p>
@@ -2523,7 +2523,7 @@
           <a:p>
             <a:fld id="{1AC609C6-5DB6-4698-A3AD-5115AB57A1D5}" type="datetimeFigureOut">
               <a:rPr lang="en-US" smtClean="0"/>
-              <a:t>4/11/2022</a:t>
+              <a:t>4/26/2022</a:t>
             </a:fld>
             <a:endParaRPr lang="en-US"/>
           </a:p>
@@ -2736,7 +2736,7 @@
           <a:p>
             <a:fld id="{1AC609C6-5DB6-4698-A3AD-5115AB57A1D5}" type="datetimeFigureOut">
               <a:rPr lang="en-US" smtClean="0"/>
-              <a:t>4/11/2022</a:t>
+              <a:t>4/26/2022</a:t>
             </a:fld>
             <a:endParaRPr lang="en-US"/>
           </a:p>
@@ -3191,7 +3191,11 @@
             <a:pPr algn="ctr"/>
             <a:r>
               <a:rPr lang="en-AU" sz="1200" dirty="0" smtClean="0"/>
-              <a:t>Observe before step</a:t>
+              <a:t>Observe </a:t>
+            </a:r>
+            <a:r>
+              <a:rPr lang="en-AU" sz="1200" dirty="0" smtClean="0"/>
+              <a:t>after step</a:t>
             </a:r>
             <a:endParaRPr lang="en-AU" sz="1200" dirty="0"/>
           </a:p>
@@ -3349,7 +3353,7 @@
         </p:nvSpPr>
         <p:spPr>
           <a:xfrm>
-            <a:off x="1686130" y="3601373"/>
+            <a:off x="1686130" y="4421566"/>
             <a:ext cx="972000" cy="432000"/>
           </a:xfrm>
           <a:prstGeom prst="rect">
@@ -3393,7 +3397,7 @@
         </p:nvSpPr>
         <p:spPr>
           <a:xfrm>
-            <a:off x="1241340" y="4289687"/>
+            <a:off x="1241340" y="5109880"/>
             <a:ext cx="1861581" cy="861155"/>
           </a:xfrm>
           <a:prstGeom prst="diamond">
@@ -3437,7 +3441,7 @@
         </p:nvSpPr>
         <p:spPr>
           <a:xfrm>
-            <a:off x="5126379" y="5503998"/>
+            <a:off x="5126379" y="6324191"/>
             <a:ext cx="1308237" cy="518753"/>
           </a:xfrm>
           <a:prstGeom prst="rect">
@@ -3525,7 +3529,7 @@
         </p:nvSpPr>
         <p:spPr>
           <a:xfrm>
-            <a:off x="1254318" y="5407156"/>
+            <a:off x="1254318" y="6227349"/>
             <a:ext cx="1835625" cy="712437"/>
           </a:xfrm>
           <a:prstGeom prst="diamond">
@@ -3569,7 +3573,7 @@
         </p:nvSpPr>
         <p:spPr>
           <a:xfrm>
-            <a:off x="1686130" y="6375907"/>
+            <a:off x="1686130" y="7196100"/>
             <a:ext cx="972000" cy="432000"/>
           </a:xfrm>
           <a:prstGeom prst="rect">
@@ -3613,7 +3617,7 @@
         </p:nvSpPr>
         <p:spPr>
           <a:xfrm>
-            <a:off x="1686130" y="7064223"/>
+            <a:off x="1686130" y="7884416"/>
             <a:ext cx="972000" cy="432000"/>
           </a:xfrm>
           <a:prstGeom prst="rect">
@@ -3701,7 +3705,7 @@
         </p:nvSpPr>
         <p:spPr>
           <a:xfrm>
-            <a:off x="3346232" y="4396265"/>
+            <a:off x="3346232" y="5216458"/>
             <a:ext cx="1296000" cy="648000"/>
           </a:xfrm>
           <a:prstGeom prst="rect">
@@ -3881,7 +3885,7 @@
         <p:spPr>
           <a:xfrm flipH="1" flipV="1">
             <a:off x="3975344" y="2458291"/>
-            <a:ext cx="18888" cy="1937974"/>
+            <a:ext cx="18888" cy="2758167"/>
           </a:xfrm>
           <a:prstGeom prst="straightConnector1">
             <a:avLst/>
@@ -3953,7 +3957,7 @@
         <p:spPr>
           <a:xfrm flipH="1" flipV="1">
             <a:off x="5768565" y="3361382"/>
-            <a:ext cx="11933" cy="2142616"/>
+            <a:ext cx="11933" cy="2962809"/>
           </a:xfrm>
           <a:prstGeom prst="straightConnector1">
             <a:avLst/>
@@ -3988,7 +3992,7 @@
         </p:nvCxnSpPr>
         <p:spPr>
           <a:xfrm>
-            <a:off x="2172130" y="6807907"/>
+            <a:off x="2172130" y="7628100"/>
             <a:ext cx="0" cy="256316"/>
           </a:xfrm>
           <a:prstGeom prst="straightConnector1">
@@ -4024,7 +4028,7 @@
         </p:nvCxnSpPr>
         <p:spPr>
           <a:xfrm flipH="1">
-            <a:off x="2172130" y="6119593"/>
+            <a:off x="2172130" y="6939786"/>
             <a:ext cx="1" cy="256314"/>
           </a:xfrm>
           <a:prstGeom prst="straightConnector1">
@@ -4060,7 +4064,7 @@
         </p:nvCxnSpPr>
         <p:spPr>
           <a:xfrm>
-            <a:off x="2172131" y="5150842"/>
+            <a:off x="2172131" y="5971035"/>
             <a:ext cx="0" cy="256314"/>
           </a:xfrm>
           <a:prstGeom prst="straightConnector1">
@@ -4096,7 +4100,7 @@
         </p:nvCxnSpPr>
         <p:spPr>
           <a:xfrm>
-            <a:off x="3102921" y="4720265"/>
+            <a:off x="3102921" y="5540458"/>
             <a:ext cx="243311" cy="0"/>
           </a:xfrm>
           <a:prstGeom prst="straightConnector1">
@@ -4132,7 +4136,7 @@
         </p:nvCxnSpPr>
         <p:spPr>
           <a:xfrm>
-            <a:off x="2172130" y="4033373"/>
+            <a:off x="2172130" y="4853566"/>
             <a:ext cx="1" cy="256314"/>
           </a:xfrm>
           <a:prstGeom prst="straightConnector1">
@@ -4162,14 +4166,14 @@
           <p:cNvPr id="48" name="Connecteur droit avec flèche 47"/>
           <p:cNvCxnSpPr>
             <a:stCxn id="12" idx="2"/>
-            <a:endCxn id="13" idx="0"/>
+            <a:endCxn id="57" idx="0"/>
           </p:cNvCxnSpPr>
           <p:nvPr/>
         </p:nvCxnSpPr>
         <p:spPr>
           <a:xfrm>
             <a:off x="2172130" y="3274490"/>
-            <a:ext cx="0" cy="326883"/>
+            <a:ext cx="0" cy="381741"/>
           </a:xfrm>
           <a:prstGeom prst="straightConnector1">
             <a:avLst/>
@@ -4312,7 +4316,7 @@
         </p:nvCxnSpPr>
         <p:spPr>
           <a:xfrm flipV="1">
-            <a:off x="2658130" y="6022751"/>
+            <a:off x="2658130" y="6842944"/>
             <a:ext cx="3122368" cy="1257472"/>
           </a:xfrm>
           <a:prstGeom prst="bentConnector2">
@@ -4348,7 +4352,7 @@
         </p:nvCxnSpPr>
         <p:spPr>
           <a:xfrm>
-            <a:off x="3089943" y="5763375"/>
+            <a:off x="3089943" y="6583568"/>
             <a:ext cx="2036436" cy="0"/>
           </a:xfrm>
           <a:prstGeom prst="straightConnector1">
@@ -4751,7 +4755,7 @@
         </p:nvSpPr>
         <p:spPr>
           <a:xfrm>
-            <a:off x="2998070" y="4451681"/>
+            <a:off x="2998070" y="5271874"/>
             <a:ext cx="365806" cy="276999"/>
           </a:xfrm>
           <a:prstGeom prst="rect">
@@ -4781,7 +4785,7 @@
         </p:nvSpPr>
         <p:spPr>
           <a:xfrm>
-            <a:off x="2132856" y="5140499"/>
+            <a:off x="2132856" y="5960692"/>
             <a:ext cx="386837" cy="276999"/>
           </a:xfrm>
           <a:prstGeom prst="rect">
@@ -4811,7 +4815,7 @@
         </p:nvSpPr>
         <p:spPr>
           <a:xfrm>
-            <a:off x="2132856" y="6084168"/>
+            <a:off x="2132856" y="6904361"/>
             <a:ext cx="386837" cy="276999"/>
           </a:xfrm>
           <a:prstGeom prst="rect">
@@ -4841,7 +4845,7 @@
         </p:nvSpPr>
         <p:spPr>
           <a:xfrm>
-            <a:off x="3800089" y="5519137"/>
+            <a:off x="3800089" y="6339330"/>
             <a:ext cx="365806" cy="276999"/>
           </a:xfrm>
           <a:prstGeom prst="rect">
@@ -4863,6 +4867,90 @@
           </a:p>
         </p:txBody>
       </p:sp>
+      <p:sp>
+        <p:nvSpPr>
+          <p:cNvPr id="57" name="Rectangle 56"/>
+          <p:cNvSpPr/>
+          <p:nvPr/>
+        </p:nvSpPr>
+        <p:spPr>
+          <a:xfrm>
+            <a:off x="1686130" y="3656231"/>
+            <a:ext cx="972000" cy="432000"/>
+          </a:xfrm>
+          <a:prstGeom prst="rect">
+            <a:avLst/>
+          </a:prstGeom>
+        </p:spPr>
+        <p:style>
+          <a:lnRef idx="2">
+            <a:schemeClr val="accent3">
+              <a:shade val="50000"/>
+            </a:schemeClr>
+          </a:lnRef>
+          <a:fillRef idx="1">
+            <a:schemeClr val="accent3"/>
+          </a:fillRef>
+          <a:effectRef idx="0">
+            <a:schemeClr val="accent3"/>
+          </a:effectRef>
+          <a:fontRef idx="minor">
+            <a:schemeClr val="lt1"/>
+          </a:fontRef>
+        </p:style>
+        <p:txBody>
+          <a:bodyPr rtlCol="0" anchor="ctr"/>
+          <a:lstStyle/>
+          <a:p>
+            <a:pPr algn="ctr"/>
+            <a:r>
+              <a:rPr lang="en-AU" sz="1200" dirty="0" smtClean="0"/>
+              <a:t>Observe </a:t>
+            </a:r>
+            <a:r>
+              <a:rPr lang="en-AU" sz="1200" dirty="0" smtClean="0"/>
+              <a:t>before step</a:t>
+            </a:r>
+            <a:endParaRPr lang="en-AU" sz="1200" dirty="0"/>
+          </a:p>
+        </p:txBody>
+      </p:sp>
+      <p:cxnSp>
+        <p:nvCxnSpPr>
+          <p:cNvPr id="58" name="Connecteur droit avec flèche 57"/>
+          <p:cNvCxnSpPr>
+            <a:stCxn id="57" idx="2"/>
+            <a:endCxn id="13" idx="0"/>
+          </p:cNvCxnSpPr>
+          <p:nvPr/>
+        </p:nvCxnSpPr>
+        <p:spPr>
+          <a:xfrm>
+            <a:off x="2172130" y="4088231"/>
+            <a:ext cx="0" cy="333335"/>
+          </a:xfrm>
+          <a:prstGeom prst="straightConnector1">
+            <a:avLst/>
+          </a:prstGeom>
+          <a:ln>
+            <a:tailEnd type="stealth" w="lg" len="med"/>
+          </a:ln>
+        </p:spPr>
+        <p:style>
+          <a:lnRef idx="1">
+            <a:schemeClr val="dk1"/>
+          </a:lnRef>
+          <a:fillRef idx="0">
+            <a:schemeClr val="dk1"/>
+          </a:fillRef>
+          <a:effectRef idx="0">
+            <a:schemeClr val="dk1"/>
+          </a:effectRef>
+          <a:fontRef idx="minor">
+            <a:schemeClr val="tx1"/>
+          </a:fontRef>
+        </p:style>
+      </p:cxnSp>
     </p:spTree>
     <p:extLst>
       <p:ext uri="{BB962C8B-B14F-4D97-AF65-F5344CB8AC3E}">

</xml_diff>